<commit_message>
added more to power point
</commit_message>
<xml_diff>
--- a/Steam - lite.pptx
+++ b/Steam - lite.pptx
@@ -6242,7 +6242,7 @@
             <a:pPr algn="ctr"/>
             <a:r>
               <a:rPr lang="en-US" dirty="0"/>
-              <a:t>Customer</a:t>
+              <a:t>Features</a:t>
             </a:r>
           </a:p>
         </p:txBody>
@@ -6266,43 +6266,93 @@
         <p:spPr>
           <a:xfrm>
             <a:off x="685800" y="2595034"/>
-            <a:ext cx="11353800" cy="3623652"/>
+            <a:ext cx="4817225" cy="3623652"/>
           </a:xfrm>
         </p:spPr>
         <p:txBody>
           <a:bodyPr>
-            <a:normAutofit/>
+            <a:normAutofit fontScale="92500" lnSpcReduction="20000"/>
           </a:bodyPr>
           <a:lstStyle/>
           <a:p>
             <a:r>
               <a:rPr lang="en-US" dirty="0"/>
-              <a:t>A customer will be able to add games that exist within the database to a personal library. </a:t>
-            </a:r>
-          </a:p>
-          <a:p>
-            <a:endParaRPr lang="en-US" dirty="0"/>
+              <a:t>Comprehensive collection of games that exist within multiple online marketplaces. </a:t>
+            </a:r>
           </a:p>
           <a:p>
             <a:r>
               <a:rPr lang="en-US" dirty="0"/>
-              <a:t>Creation and management of customized game collections so that players can filter their library based on personal preference. </a:t>
-            </a:r>
-          </a:p>
-          <a:p>
-            <a:endParaRPr lang="en-US" dirty="0"/>
+              <a:t>Personal libraries that track games owned across the same marketplaces.</a:t>
+            </a:r>
           </a:p>
           <a:p>
             <a:r>
               <a:rPr lang="en-US" dirty="0"/>
-              <a:t>They will also be able to add other users of the system to a friends list, from which they can possibly see what other games their friends own and the marketplace from which it was purchased.</a:t>
-            </a:r>
-          </a:p>
-          <a:p>
-            <a:endParaRPr lang="en-US" dirty="0"/>
-          </a:p>
-        </p:txBody>
-      </p:sp>
+              <a:t>Customized collections</a:t>
+            </a:r>
+          </a:p>
+          <a:p>
+            <a:r>
+              <a:rPr lang="en-US" dirty="0"/>
+              <a:t>Able to add other users as friends, being able to see their alias’ across the other marketplaces they use as well as the games they own</a:t>
+            </a:r>
+          </a:p>
+          <a:p>
+            <a:r>
+              <a:rPr lang="en-US" dirty="0"/>
+              <a:t>Able to send messages to other users.</a:t>
+            </a:r>
+          </a:p>
+        </p:txBody>
+      </p:sp>
+      <p:pic>
+        <p:nvPicPr>
+          <p:cNvPr id="1030" name="Picture 6">
+            <a:extLst>
+              <a:ext uri="{FF2B5EF4-FFF2-40B4-BE49-F238E27FC236}">
+                <a16:creationId xmlns:a16="http://schemas.microsoft.com/office/drawing/2014/main" id="{89AAF26D-6656-4BA8-9889-A93007538AC9}"/>
+              </a:ext>
+            </a:extLst>
+          </p:cNvPr>
+          <p:cNvPicPr>
+            <a:picLocks noChangeAspect="1" noChangeArrowheads="1"/>
+          </p:cNvPicPr>
+          <p:nvPr/>
+        </p:nvPicPr>
+        <p:blipFill>
+          <a:blip r:embed="rId2">
+            <a:extLst>
+              <a:ext uri="{28A0092B-C50C-407E-A947-70E740481C1C}">
+                <a14:useLocalDpi xmlns:a14="http://schemas.microsoft.com/office/drawing/2010/main" val="0"/>
+              </a:ext>
+            </a:extLst>
+          </a:blip>
+          <a:srcRect/>
+          <a:stretch>
+            <a:fillRect/>
+          </a:stretch>
+        </p:blipFill>
+        <p:spPr bwMode="auto">
+          <a:xfrm>
+            <a:off x="5575071" y="2525675"/>
+            <a:ext cx="6162971" cy="3600405"/>
+          </a:xfrm>
+          <a:prstGeom prst="rect">
+            <a:avLst/>
+          </a:prstGeom>
+          <a:noFill/>
+          <a:extLst>
+            <a:ext uri="{909E8E84-426E-40DD-AFC4-6F175D3DCCD1}">
+              <a14:hiddenFill xmlns:a14="http://schemas.microsoft.com/office/drawing/2010/main">
+                <a:solidFill>
+                  <a:srgbClr val="FFFFFF"/>
+                </a:solidFill>
+              </a14:hiddenFill>
+            </a:ext>
+          </a:extLst>
+        </p:spPr>
+      </p:pic>
     </p:spTree>
     <p:extLst>
       <p:ext uri="{BB962C8B-B14F-4D97-AF65-F5344CB8AC3E}">
@@ -6976,7 +7026,7 @@
           <a:bodyPr/>
           <a:lstStyle/>
           <a:p>
-            <a:endParaRPr lang="en-US"/>
+            <a:endParaRPr lang="en-US" dirty="0"/>
           </a:p>
         </p:txBody>
       </p:sp>

</xml_diff>

<commit_message>
added more to end slides
</commit_message>
<xml_diff>
--- a/Steam - lite.pptx
+++ b/Steam - lite.pptx
@@ -13,7 +13,7 @@
     <p:sldId id="262" r:id="rId7"/>
     <p:sldId id="263" r:id="rId8"/>
     <p:sldId id="264" r:id="rId9"/>
-    <p:sldId id="265" r:id="rId10"/>
+    <p:sldId id="266" r:id="rId10"/>
   </p:sldIdLst>
   <p:sldSz cx="12192000" cy="6858000"/>
   <p:notesSz cx="6858000" cy="9144000"/>
@@ -7026,6 +7026,36 @@
           <a:bodyPr/>
           <a:lstStyle/>
           <a:p>
+            <a:r>
+              <a:rPr lang="en-US" dirty="0"/>
+              <a:t>Restricted view of customer entity which will only show ID and alias. This removes personal information from being accessible.</a:t>
+            </a:r>
+          </a:p>
+          <a:p>
+            <a:r>
+              <a:rPr lang="en-US" dirty="0"/>
+              <a:t>Friend view allows for users to view their friends alias’ from the most popular gaming marketplaces.</a:t>
+            </a:r>
+          </a:p>
+          <a:p>
+            <a:r>
+              <a:rPr lang="en-US" dirty="0"/>
+              <a:t>A display of each game, with basic information about the game as well as each of its descriptor tags.</a:t>
+            </a:r>
+          </a:p>
+          <a:p>
+            <a:r>
+              <a:rPr lang="en-US" dirty="0"/>
+              <a:t>A report that shows all the lifetime sales for developers and publishers.</a:t>
+            </a:r>
+          </a:p>
+          <a:p>
+            <a:r>
+              <a:rPr lang="en-US" dirty="0"/>
+              <a:t>A report that shows how many accounts have each game in their library. </a:t>
+            </a:r>
+          </a:p>
+          <a:p>
             <a:endParaRPr lang="en-US" dirty="0"/>
           </a:p>
         </p:txBody>
@@ -7062,10 +7092,10 @@
       </p:grpSpPr>
       <p:sp>
         <p:nvSpPr>
-          <p:cNvPr id="2" name="Title 1">
+          <p:cNvPr id="3" name="Text Placeholder 2">
             <a:extLst>
               <a:ext uri="{FF2B5EF4-FFF2-40B4-BE49-F238E27FC236}">
-                <a16:creationId xmlns:a16="http://schemas.microsoft.com/office/drawing/2014/main" id="{14C6DC5F-4591-48FE-8C9F-33D608DDED63}"/>
+                <a16:creationId xmlns:a16="http://schemas.microsoft.com/office/drawing/2014/main" id="{2096CDF1-93AC-4A08-A8D8-993D9657523E}"/>
               </a:ext>
             </a:extLst>
           </p:cNvPr>
@@ -7073,10 +7103,15 @@
             <a:spLocks noGrp="1"/>
           </p:cNvSpPr>
           <p:nvPr>
-            <p:ph type="title"/>
-          </p:nvPr>
-        </p:nvSpPr>
-        <p:spPr/>
+            <p:ph type="body" idx="1"/>
+          </p:nvPr>
+        </p:nvSpPr>
+        <p:spPr>
+          <a:xfrm>
+            <a:off x="801691" y="803889"/>
+            <a:ext cx="5079991" cy="823912"/>
+          </a:xfrm>
+        </p:spPr>
         <p:txBody>
           <a:bodyPr/>
           <a:lstStyle/>
@@ -7084,17 +7119,17 @@
             <a:pPr algn="ctr"/>
             <a:r>
               <a:rPr lang="en-US" dirty="0"/>
-              <a:t>Triggers - Queries</a:t>
-            </a:r>
-          </a:p>
-        </p:txBody>
-      </p:sp>
-      <p:sp>
-        <p:nvSpPr>
-          <p:cNvPr id="3" name="Content Placeholder 2">
+              <a:t>Triggers</a:t>
+            </a:r>
+          </a:p>
+        </p:txBody>
+      </p:sp>
+      <p:sp>
+        <p:nvSpPr>
+          <p:cNvPr id="4" name="Content Placeholder 3">
             <a:extLst>
               <a:ext uri="{FF2B5EF4-FFF2-40B4-BE49-F238E27FC236}">
-                <a16:creationId xmlns:a16="http://schemas.microsoft.com/office/drawing/2014/main" id="{D4192621-13D1-47BD-B43B-91B446593263}"/>
+                <a16:creationId xmlns:a16="http://schemas.microsoft.com/office/drawing/2014/main" id="{D7F9EF93-B0CB-4C0E-8CFC-5936F8CAD6BF}"/>
               </a:ext>
             </a:extLst>
           </p:cNvPr>
@@ -7102,22 +7137,125 @@
             <a:spLocks noGrp="1"/>
           </p:cNvSpPr>
           <p:nvPr>
-            <p:ph idx="1"/>
-          </p:nvPr>
-        </p:nvSpPr>
-        <p:spPr/>
+            <p:ph sz="half" idx="2"/>
+          </p:nvPr>
+        </p:nvSpPr>
+        <p:spPr>
+          <a:xfrm>
+            <a:off x="685798" y="1885990"/>
+            <a:ext cx="5311775" cy="4168121"/>
+          </a:xfrm>
+        </p:spPr>
+        <p:txBody>
+          <a:bodyPr>
+            <a:normAutofit fontScale="92500" lnSpcReduction="10000"/>
+          </a:bodyPr>
+          <a:lstStyle/>
+          <a:p>
+            <a:r>
+              <a:rPr lang="en-US" dirty="0"/>
+              <a:t>After a new game review is made, the game’s avg rating is updated within the game entity.</a:t>
+            </a:r>
+          </a:p>
+          <a:p>
+            <a:r>
+              <a:rPr lang="en-US" dirty="0"/>
+              <a:t>Counters within game, developer and publisher are incremented after a game is added to the database that is connected to the companies (developer &amp; publisher) or when the game is added to someone’s library (game).</a:t>
+            </a:r>
+          </a:p>
+          <a:p>
+            <a:r>
+              <a:rPr lang="en-US" dirty="0"/>
+              <a:t>Users are limited to the number of collections they can create, before a new one can be created the database is checked to see that the user has not reached the limit.</a:t>
+            </a:r>
+          </a:p>
+        </p:txBody>
+      </p:sp>
+      <p:sp>
+        <p:nvSpPr>
+          <p:cNvPr id="5" name="Text Placeholder 4">
+            <a:extLst>
+              <a:ext uri="{FF2B5EF4-FFF2-40B4-BE49-F238E27FC236}">
+                <a16:creationId xmlns:a16="http://schemas.microsoft.com/office/drawing/2014/main" id="{41BF5625-8B9E-4AA1-9B49-504D9BA4FC6C}"/>
+              </a:ext>
+            </a:extLst>
+          </p:cNvPr>
+          <p:cNvSpPr>
+            <a:spLocks noGrp="1"/>
+          </p:cNvSpPr>
+          <p:nvPr>
+            <p:ph type="body" sz="quarter" idx="3"/>
+          </p:nvPr>
+        </p:nvSpPr>
+        <p:spPr>
+          <a:xfrm>
+            <a:off x="6400800" y="803889"/>
+            <a:ext cx="5105400" cy="823912"/>
+          </a:xfrm>
+        </p:spPr>
         <p:txBody>
           <a:bodyPr/>
           <a:lstStyle/>
           <a:p>
-            <a:endParaRPr lang="en-US"/>
+            <a:pPr algn="ctr"/>
+            <a:r>
+              <a:rPr lang="en-US" dirty="0"/>
+              <a:t>Queries</a:t>
+            </a:r>
+          </a:p>
+        </p:txBody>
+      </p:sp>
+      <p:sp>
+        <p:nvSpPr>
+          <p:cNvPr id="6" name="Content Placeholder 5">
+            <a:extLst>
+              <a:ext uri="{FF2B5EF4-FFF2-40B4-BE49-F238E27FC236}">
+                <a16:creationId xmlns:a16="http://schemas.microsoft.com/office/drawing/2014/main" id="{682551DF-2844-446B-9C2D-B2AD9172713A}"/>
+              </a:ext>
+            </a:extLst>
+          </p:cNvPr>
+          <p:cNvSpPr>
+            <a:spLocks noGrp="1"/>
+          </p:cNvSpPr>
+          <p:nvPr>
+            <p:ph sz="quarter" idx="4"/>
+          </p:nvPr>
+        </p:nvSpPr>
+        <p:spPr>
+          <a:xfrm>
+            <a:off x="6172200" y="1885990"/>
+            <a:ext cx="5334000" cy="4168121"/>
+          </a:xfrm>
+        </p:spPr>
+        <p:txBody>
+          <a:bodyPr>
+            <a:normAutofit fontScale="92500" lnSpcReduction="10000"/>
+          </a:bodyPr>
+          <a:lstStyle/>
+          <a:p>
+            <a:r>
+              <a:rPr lang="en-US" dirty="0"/>
+              <a:t>Search for games/DLC by title, rating, tags, developer, publisher, price, discount and/or if a friend owns it.</a:t>
+            </a:r>
+          </a:p>
+          <a:p>
+            <a:r>
+              <a:rPr lang="en-US" dirty="0"/>
+              <a:t>Search for other users by alias.</a:t>
+            </a:r>
+          </a:p>
+          <a:p>
+            <a:r>
+              <a:rPr lang="en-US" dirty="0"/>
+              <a:t>Search for developers/publishers by name or average rating based on all their games in the database. </a:t>
+            </a:r>
           </a:p>
         </p:txBody>
       </p:sp>
     </p:spTree>
     <p:extLst>
       <p:ext uri="{BB962C8B-B14F-4D97-AF65-F5344CB8AC3E}">
-        <p14:creationId xmlns:p14="http://schemas.microsoft.com/office/powerpoint/2010/main" val="4274846411"/>
+        <p14:creationId xmlns:p14="http://schemas.microsoft.com/office/powerpoint/2010/main" val="1278965015"/>
       </p:ext>
     </p:extLst>
   </p:cSld>

</xml_diff>